<commit_message>
Coded updates for cleaning and FY tables
</commit_message>
<xml_diff>
--- a/QuadChartTemplate.pptx
+++ b/QuadChartTemplate.pptx
@@ -409,6 +409,11 @@
         </p:txBody>
       </p:sp>
     </p:spTree>
+    <p:extLst>
+      <p:ext uri="{BB962C8B-B14F-4D97-AF65-F5344CB8AC3E}">
+        <p14:creationId xmlns:p14="http://schemas.microsoft.com/office/powerpoint/2010/main" val="1"/>
+      </p:ext>
+    </p:extLst>
   </p:cSld>
   <p:clrMap bg1="lt1" tx1="dk1" bg2="lt2" tx2="dk2" accent1="accent1" accent2="accent2" accent3="accent3" accent4="accent4" accent5="accent5" accent6="accent6" hlink="hlink" folHlink="folHlink"/>
 </p:handoutMaster>
@@ -1070,7 +1075,7 @@
               <a:pPr algn="l">
                 <a:defRPr/>
               </a:pPr>
-              <a:t>12/29/2023</a:t>
+              <a:t>1/23/2024</a:t>
             </a:fld>
             <a:r>
               <a:rPr lang="en-US" altLang="en-US" sz="800">
@@ -4381,7 +4386,7 @@
         </p:nvSpPr>
         <p:spPr>
           <a:xfrm>
-            <a:off x="1683272" y="307607"/>
+            <a:off x="1683272" y="193304"/>
             <a:ext cx="7460728" cy="650678"/>
           </a:xfrm>
         </p:spPr>
@@ -4543,6 +4548,36 @@
           <a:p>
             <a:pPr lvl="0"/>
             <a:endParaRPr lang="en-US" dirty="0"/>
+          </a:p>
+        </p:txBody>
+      </p:sp>
+      <p:sp>
+        <p:nvSpPr>
+          <p:cNvPr id="8" name="Table Placeholder 7">
+            <a:extLst>
+              <a:ext uri="{FF2B5EF4-FFF2-40B4-BE49-F238E27FC236}">
+                <a16:creationId xmlns:a16="http://schemas.microsoft.com/office/drawing/2014/main" id="{151077C3-3517-0D21-35B9-D56F5ADFFCFD}"/>
+              </a:ext>
+            </a:extLst>
+          </p:cNvPr>
+          <p:cNvSpPr>
+            <a:spLocks noGrp="1"/>
+          </p:cNvSpPr>
+          <p:nvPr>
+            <p:ph type="tbl" sz="quarter" idx="15"/>
+          </p:nvPr>
+        </p:nvSpPr>
+        <p:spPr>
+          <a:xfrm>
+            <a:off x="76201" y="4648202"/>
+            <a:ext cx="4438358" cy="1414462"/>
+          </a:xfrm>
+        </p:spPr>
+        <p:txBody>
+          <a:bodyPr/>
+          <a:lstStyle/>
+          <a:p>
+            <a:endParaRPr lang="en-US"/>
           </a:p>
         </p:txBody>
       </p:sp>
@@ -8836,111 +8871,12 @@
           </a:p>
         </p:txBody>
       </p:sp>
-      <p:graphicFrame>
-        <p:nvGraphicFramePr>
-          <p:cNvPr id="7173" name="Object 66">
+      <p:sp>
+        <p:nvSpPr>
+          <p:cNvPr id="2" name="Text Placeholder 1">
             <a:extLst>
               <a:ext uri="{FF2B5EF4-FFF2-40B4-BE49-F238E27FC236}">
-                <a16:creationId xmlns:a16="http://schemas.microsoft.com/office/drawing/2014/main" id="{4367AFF4-85AA-49E3-9586-01CA0476B064}"/>
-              </a:ext>
-            </a:extLst>
-          </p:cNvPr>
-          <p:cNvGraphicFramePr>
-            <a:graphicFrameLocks noChangeAspect="1"/>
-          </p:cNvGraphicFramePr>
-          <p:nvPr>
-            <p:extLst>
-              <p:ext uri="{D42A27DB-BD31-4B8C-83A1-F6EECF244321}">
-                <p14:modId xmlns:p14="http://schemas.microsoft.com/office/powerpoint/2010/main" val="2116317803"/>
-              </p:ext>
-            </p:extLst>
-          </p:nvPr>
-        </p:nvGraphicFramePr>
-        <p:xfrm>
-          <a:off x="220663" y="4887913"/>
-          <a:ext cx="3695700" cy="1230312"/>
-        </p:xfrm>
-        <a:graphic>
-          <a:graphicData uri="http://schemas.openxmlformats.org/presentationml/2006/ole">
-            <mc:AlternateContent xmlns:mc="http://schemas.openxmlformats.org/markup-compatibility/2006">
-              <mc:Choice xmlns:v="urn:schemas-microsoft-com:vml" Requires="v">
-                <p:oleObj spid="_x0000_s7195" name="Worksheet" r:id="rId3" imgW="2038512" imgH="676275" progId="Excel.Sheet.8">
-                  <p:embed/>
-                </p:oleObj>
-              </mc:Choice>
-              <mc:Fallback>
-                <p:oleObj name="Worksheet" r:id="rId3" imgW="2038512" imgH="676275" progId="Excel.Sheet.8">
-                  <p:embed/>
-                  <p:pic>
-                    <p:nvPicPr>
-                      <p:cNvPr id="0" name="Object 66"/>
-                      <p:cNvPicPr>
-                        <a:picLocks noChangeAspect="1" noChangeArrowheads="1"/>
-                      </p:cNvPicPr>
-                      <p:nvPr/>
-                    </p:nvPicPr>
-                    <p:blipFill>
-                      <a:blip r:embed="rId4"/>
-                      <a:srcRect/>
-                      <a:stretch>
-                        <a:fillRect/>
-                      </a:stretch>
-                    </p:blipFill>
-                    <p:spPr bwMode="auto">
-                      <a:xfrm>
-                        <a:off x="220663" y="4887913"/>
-                        <a:ext cx="3695700" cy="1230312"/>
-                      </a:xfrm>
-                      <a:prstGeom prst="rect">
-                        <a:avLst/>
-                      </a:prstGeom>
-                      <a:noFill/>
-                      <a:ln>
-                        <a:noFill/>
-                      </a:ln>
-                      <a:effectLst/>
-                      <a:extLst>
-                        <a:ext uri="{909E8E84-426E-40DD-AFC4-6F175D3DCCD1}">
-                          <a14:hiddenFill xmlns:a14="http://schemas.microsoft.com/office/drawing/2010/main">
-                            <a:solidFill>
-                              <a:schemeClr val="accent1"/>
-                            </a:solidFill>
-                          </a14:hiddenFill>
-                        </a:ext>
-                        <a:ext uri="{91240B29-F687-4F45-9708-019B960494DF}">
-                          <a14:hiddenLine xmlns:a14="http://schemas.microsoft.com/office/drawing/2010/main" w="12700">
-                            <a:solidFill>
-                              <a:schemeClr val="tx1"/>
-                            </a:solidFill>
-                            <a:miter lim="800000"/>
-                            <a:headEnd type="none" w="sm" len="sm"/>
-                            <a:tailEnd type="none" w="sm" len="sm"/>
-                          </a14:hiddenLine>
-                        </a:ext>
-                        <a:ext uri="{AF507438-7753-43E0-B8FC-AC1667EBCBE1}">
-                          <a14:hiddenEffects xmlns:a14="http://schemas.microsoft.com/office/drawing/2010/main">
-                            <a:effectLst>
-                              <a:outerShdw dist="35921" dir="2700000" algn="ctr" rotWithShape="0">
-                                <a:schemeClr val="bg2"/>
-                              </a:outerShdw>
-                            </a:effectLst>
-                          </a14:hiddenEffects>
-                        </a:ext>
-                      </a:extLst>
-                    </p:spPr>
-                  </p:pic>
-                </p:oleObj>
-              </mc:Fallback>
-            </mc:AlternateContent>
-          </a:graphicData>
-        </a:graphic>
-      </p:graphicFrame>
-      <p:sp>
-        <p:nvSpPr>
-          <p:cNvPr id="7" name="Text Placeholder 6">
-            <a:extLst>
-              <a:ext uri="{FF2B5EF4-FFF2-40B4-BE49-F238E27FC236}">
-                <a16:creationId xmlns:a16="http://schemas.microsoft.com/office/drawing/2014/main" id="{CE14923F-B711-44FB-8685-C9A4956EBD5C}"/>
+                <a16:creationId xmlns:a16="http://schemas.microsoft.com/office/drawing/2014/main" id="{3B244F2B-8ADE-94C6-2E9D-706D206D9B1C}"/>
               </a:ext>
             </a:extLst>
           </p:cNvPr>
@@ -8962,10 +8898,10 @@
       </p:sp>
       <p:sp>
         <p:nvSpPr>
-          <p:cNvPr id="8" name="Text Placeholder 7">
+          <p:cNvPr id="3" name="Text Placeholder 2">
             <a:extLst>
               <a:ext uri="{FF2B5EF4-FFF2-40B4-BE49-F238E27FC236}">
-                <a16:creationId xmlns:a16="http://schemas.microsoft.com/office/drawing/2014/main" id="{2DE3D8C8-1245-424C-8EC4-E31F3BC2F1FB}"/>
+                <a16:creationId xmlns:a16="http://schemas.microsoft.com/office/drawing/2014/main" id="{6CD9A0FF-BDDE-72A4-01E8-909A8AE9BEF4}"/>
               </a:ext>
             </a:extLst>
           </p:cNvPr>
@@ -8987,10 +8923,10 @@
       </p:sp>
       <p:sp>
         <p:nvSpPr>
-          <p:cNvPr id="9" name="Text Placeholder 8">
+          <p:cNvPr id="4" name="Text Placeholder 3">
             <a:extLst>
               <a:ext uri="{FF2B5EF4-FFF2-40B4-BE49-F238E27FC236}">
-                <a16:creationId xmlns:a16="http://schemas.microsoft.com/office/drawing/2014/main" id="{407C6671-CE29-4615-BA16-DFA9971EDD9F}"/>
+                <a16:creationId xmlns:a16="http://schemas.microsoft.com/office/drawing/2014/main" id="{CAC24604-684E-9FDE-083E-ECC69C76F3E0}"/>
               </a:ext>
             </a:extLst>
           </p:cNvPr>
@@ -9012,10 +8948,10 @@
       </p:sp>
       <p:sp>
         <p:nvSpPr>
-          <p:cNvPr id="10" name="Text Placeholder 9">
+          <p:cNvPr id="5" name="Text Placeholder 4">
             <a:extLst>
               <a:ext uri="{FF2B5EF4-FFF2-40B4-BE49-F238E27FC236}">
-                <a16:creationId xmlns:a16="http://schemas.microsoft.com/office/drawing/2014/main" id="{27A5A041-19EA-4946-AC58-A51459C675AA}"/>
+                <a16:creationId xmlns:a16="http://schemas.microsoft.com/office/drawing/2014/main" id="{402D71C9-FD26-3E28-67F0-3DF8B232BAA4}"/>
               </a:ext>
             </a:extLst>
           </p:cNvPr>
@@ -9037,10 +8973,10 @@
       </p:sp>
       <p:sp>
         <p:nvSpPr>
-          <p:cNvPr id="11" name="Text Placeholder 10">
+          <p:cNvPr id="6" name="Text Placeholder 5">
             <a:extLst>
               <a:ext uri="{FF2B5EF4-FFF2-40B4-BE49-F238E27FC236}">
-                <a16:creationId xmlns:a16="http://schemas.microsoft.com/office/drawing/2014/main" id="{569DA09E-D3A3-45B5-B096-CF71F65E0399}"/>
+                <a16:creationId xmlns:a16="http://schemas.microsoft.com/office/drawing/2014/main" id="{846AF8B5-3A2C-BB3F-29C2-A0266FABAA4D}"/>
               </a:ext>
             </a:extLst>
           </p:cNvPr>
@@ -9060,6 +8996,737 @@
           </a:p>
         </p:txBody>
       </p:sp>
+      <p:graphicFrame>
+        <p:nvGraphicFramePr>
+          <p:cNvPr id="13" name="Table Placeholder 12">
+            <a:extLst>
+              <a:ext uri="{FF2B5EF4-FFF2-40B4-BE49-F238E27FC236}">
+                <a16:creationId xmlns:a16="http://schemas.microsoft.com/office/drawing/2014/main" id="{E6EC5180-F429-6B7E-F713-229A6B1FA2F9}"/>
+              </a:ext>
+            </a:extLst>
+          </p:cNvPr>
+          <p:cNvGraphicFramePr>
+            <a:graphicFrameLocks noGrp="1"/>
+          </p:cNvGraphicFramePr>
+          <p:nvPr>
+            <p:ph type="tbl" sz="quarter" idx="15"/>
+            <p:extLst>
+              <p:ext uri="{D42A27DB-BD31-4B8C-83A1-F6EECF244321}">
+                <p14:modId xmlns:p14="http://schemas.microsoft.com/office/powerpoint/2010/main" val="1874872562"/>
+              </p:ext>
+            </p:extLst>
+          </p:nvPr>
+        </p:nvGraphicFramePr>
+        <p:xfrm>
+          <a:off x="75913" y="4740275"/>
+          <a:ext cx="4394487" cy="741680"/>
+        </p:xfrm>
+        <a:graphic>
+          <a:graphicData uri="http://schemas.openxmlformats.org/drawingml/2006/table">
+            <a:tbl>
+              <a:tblPr firstRow="1" bandRow="1">
+                <a:tableStyleId>{5C22544A-7EE6-4342-B048-85BDC9FD1C3A}</a:tableStyleId>
+              </a:tblPr>
+              <a:tblGrid>
+                <a:gridCol w="887730">
+                  <a:extLst>
+                    <a:ext uri="{9D8B030D-6E8A-4147-A177-3AD203B41FA5}">
+                      <a16:colId xmlns:a16="http://schemas.microsoft.com/office/drawing/2014/main" val="293800623"/>
+                    </a:ext>
+                  </a:extLst>
+                </a:gridCol>
+                <a:gridCol w="887730">
+                  <a:extLst>
+                    <a:ext uri="{9D8B030D-6E8A-4147-A177-3AD203B41FA5}">
+                      <a16:colId xmlns:a16="http://schemas.microsoft.com/office/drawing/2014/main" val="597979698"/>
+                    </a:ext>
+                  </a:extLst>
+                </a:gridCol>
+                <a:gridCol w="887730">
+                  <a:extLst>
+                    <a:ext uri="{9D8B030D-6E8A-4147-A177-3AD203B41FA5}">
+                      <a16:colId xmlns:a16="http://schemas.microsoft.com/office/drawing/2014/main" val="1090221132"/>
+                    </a:ext>
+                  </a:extLst>
+                </a:gridCol>
+                <a:gridCol w="887730">
+                  <a:extLst>
+                    <a:ext uri="{9D8B030D-6E8A-4147-A177-3AD203B41FA5}">
+                      <a16:colId xmlns:a16="http://schemas.microsoft.com/office/drawing/2014/main" val="1746695190"/>
+                    </a:ext>
+                  </a:extLst>
+                </a:gridCol>
+                <a:gridCol w="843567">
+                  <a:extLst>
+                    <a:ext uri="{9D8B030D-6E8A-4147-A177-3AD203B41FA5}">
+                      <a16:colId xmlns:a16="http://schemas.microsoft.com/office/drawing/2014/main" val="686820381"/>
+                    </a:ext>
+                  </a:extLst>
+                </a:gridCol>
+              </a:tblGrid>
+              <a:tr h="370840">
+                <a:tc>
+                  <a:txBody>
+                    <a:bodyPr/>
+                    <a:lstStyle/>
+                    <a:p>
+                      <a:pPr algn="ctr"/>
+                      <a:r>
+                        <a:rPr lang="en-US" sz="1400" dirty="0">
+                          <a:solidFill>
+                            <a:sysClr val="windowText" lastClr="000000"/>
+                          </a:solidFill>
+                        </a:rPr>
+                        <a:t>APPN</a:t>
+                      </a:r>
+                    </a:p>
+                  </a:txBody>
+                  <a:tcPr>
+                    <a:lnL w="12700" cap="flat" cmpd="sng" algn="ctr">
+                      <a:solidFill>
+                        <a:schemeClr val="tx1"/>
+                      </a:solidFill>
+                      <a:prstDash val="solid"/>
+                      <a:round/>
+                      <a:headEnd type="none" w="med" len="med"/>
+                      <a:tailEnd type="none" w="med" len="med"/>
+                    </a:lnL>
+                    <a:lnR w="12700" cap="flat" cmpd="sng" algn="ctr">
+                      <a:solidFill>
+                        <a:schemeClr val="tx1"/>
+                      </a:solidFill>
+                      <a:prstDash val="solid"/>
+                      <a:round/>
+                      <a:headEnd type="none" w="med" len="med"/>
+                      <a:tailEnd type="none" w="med" len="med"/>
+                    </a:lnR>
+                    <a:lnT w="12700" cap="flat" cmpd="sng" algn="ctr">
+                      <a:solidFill>
+                        <a:schemeClr val="tx1"/>
+                      </a:solidFill>
+                      <a:prstDash val="solid"/>
+                      <a:round/>
+                      <a:headEnd type="none" w="med" len="med"/>
+                      <a:tailEnd type="none" w="med" len="med"/>
+                    </a:lnT>
+                    <a:lnB w="12700" cap="flat" cmpd="sng" algn="ctr">
+                      <a:solidFill>
+                        <a:schemeClr val="tx1"/>
+                      </a:solidFill>
+                      <a:prstDash val="solid"/>
+                      <a:round/>
+                      <a:headEnd type="none" w="med" len="med"/>
+                      <a:tailEnd type="none" w="med" len="med"/>
+                    </a:lnB>
+                    <a:lnTlToBr w="12700" cmpd="sng">
+                      <a:noFill/>
+                      <a:prstDash val="solid"/>
+                    </a:lnTlToBr>
+                    <a:lnBlToTr w="12700" cmpd="sng">
+                      <a:noFill/>
+                      <a:prstDash val="solid"/>
+                    </a:lnBlToTr>
+                    <a:solidFill>
+                      <a:schemeClr val="bg1"/>
+                    </a:solidFill>
+                  </a:tcPr>
+                </a:tc>
+                <a:tc>
+                  <a:txBody>
+                    <a:bodyPr/>
+                    <a:lstStyle/>
+                    <a:p>
+                      <a:pPr algn="ctr"/>
+                      <a:r>
+                        <a:rPr lang="en-US" sz="1400" dirty="0">
+                          <a:solidFill>
+                            <a:sysClr val="windowText" lastClr="000000"/>
+                          </a:solidFill>
+                        </a:rPr>
+                        <a:t>FY24</a:t>
+                      </a:r>
+                    </a:p>
+                  </a:txBody>
+                  <a:tcPr>
+                    <a:lnL w="12700" cap="flat" cmpd="sng" algn="ctr">
+                      <a:solidFill>
+                        <a:schemeClr val="tx1"/>
+                      </a:solidFill>
+                      <a:prstDash val="solid"/>
+                      <a:round/>
+                      <a:headEnd type="none" w="med" len="med"/>
+                      <a:tailEnd type="none" w="med" len="med"/>
+                    </a:lnL>
+                    <a:lnR w="12700" cap="flat" cmpd="sng" algn="ctr">
+                      <a:solidFill>
+                        <a:schemeClr val="tx1"/>
+                      </a:solidFill>
+                      <a:prstDash val="solid"/>
+                      <a:round/>
+                      <a:headEnd type="none" w="med" len="med"/>
+                      <a:tailEnd type="none" w="med" len="med"/>
+                    </a:lnR>
+                    <a:lnT w="12700" cap="flat" cmpd="sng" algn="ctr">
+                      <a:solidFill>
+                        <a:schemeClr val="tx1"/>
+                      </a:solidFill>
+                      <a:prstDash val="solid"/>
+                      <a:round/>
+                      <a:headEnd type="none" w="med" len="med"/>
+                      <a:tailEnd type="none" w="med" len="med"/>
+                    </a:lnT>
+                    <a:lnB w="12700" cap="flat" cmpd="sng" algn="ctr">
+                      <a:solidFill>
+                        <a:schemeClr val="tx1"/>
+                      </a:solidFill>
+                      <a:prstDash val="solid"/>
+                      <a:round/>
+                      <a:headEnd type="none" w="med" len="med"/>
+                      <a:tailEnd type="none" w="med" len="med"/>
+                    </a:lnB>
+                    <a:lnTlToBr w="12700" cmpd="sng">
+                      <a:noFill/>
+                      <a:prstDash val="solid"/>
+                    </a:lnTlToBr>
+                    <a:lnBlToTr w="12700" cmpd="sng">
+                      <a:noFill/>
+                      <a:prstDash val="solid"/>
+                    </a:lnBlToTr>
+                    <a:solidFill>
+                      <a:schemeClr val="bg1"/>
+                    </a:solidFill>
+                  </a:tcPr>
+                </a:tc>
+                <a:tc>
+                  <a:txBody>
+                    <a:bodyPr/>
+                    <a:lstStyle/>
+                    <a:p>
+                      <a:pPr algn="ctr"/>
+                      <a:r>
+                        <a:rPr lang="en-US" sz="1400" dirty="0">
+                          <a:solidFill>
+                            <a:sysClr val="windowText" lastClr="000000"/>
+                          </a:solidFill>
+                        </a:rPr>
+                        <a:t>FY25</a:t>
+                      </a:r>
+                    </a:p>
+                  </a:txBody>
+                  <a:tcPr>
+                    <a:lnL w="12700" cap="flat" cmpd="sng" algn="ctr">
+                      <a:solidFill>
+                        <a:schemeClr val="tx1"/>
+                      </a:solidFill>
+                      <a:prstDash val="solid"/>
+                      <a:round/>
+                      <a:headEnd type="none" w="med" len="med"/>
+                      <a:tailEnd type="none" w="med" len="med"/>
+                    </a:lnL>
+                    <a:lnR w="12700" cap="flat" cmpd="sng" algn="ctr">
+                      <a:solidFill>
+                        <a:schemeClr val="tx1"/>
+                      </a:solidFill>
+                      <a:prstDash val="solid"/>
+                      <a:round/>
+                      <a:headEnd type="none" w="med" len="med"/>
+                      <a:tailEnd type="none" w="med" len="med"/>
+                    </a:lnR>
+                    <a:lnT w="12700" cap="flat" cmpd="sng" algn="ctr">
+                      <a:solidFill>
+                        <a:schemeClr val="tx1"/>
+                      </a:solidFill>
+                      <a:prstDash val="solid"/>
+                      <a:round/>
+                      <a:headEnd type="none" w="med" len="med"/>
+                      <a:tailEnd type="none" w="med" len="med"/>
+                    </a:lnT>
+                    <a:lnB w="12700" cap="flat" cmpd="sng" algn="ctr">
+                      <a:solidFill>
+                        <a:schemeClr val="tx1"/>
+                      </a:solidFill>
+                      <a:prstDash val="solid"/>
+                      <a:round/>
+                      <a:headEnd type="none" w="med" len="med"/>
+                      <a:tailEnd type="none" w="med" len="med"/>
+                    </a:lnB>
+                    <a:lnTlToBr w="12700" cmpd="sng">
+                      <a:noFill/>
+                      <a:prstDash val="solid"/>
+                    </a:lnTlToBr>
+                    <a:lnBlToTr w="12700" cmpd="sng">
+                      <a:noFill/>
+                      <a:prstDash val="solid"/>
+                    </a:lnBlToTr>
+                    <a:solidFill>
+                      <a:schemeClr val="bg1"/>
+                    </a:solidFill>
+                  </a:tcPr>
+                </a:tc>
+                <a:tc>
+                  <a:txBody>
+                    <a:bodyPr/>
+                    <a:lstStyle/>
+                    <a:p>
+                      <a:pPr algn="ctr"/>
+                      <a:r>
+                        <a:rPr lang="en-US" sz="1400" dirty="0">
+                          <a:solidFill>
+                            <a:sysClr val="windowText" lastClr="000000"/>
+                          </a:solidFill>
+                        </a:rPr>
+                        <a:t>FY26</a:t>
+                      </a:r>
+                    </a:p>
+                  </a:txBody>
+                  <a:tcPr>
+                    <a:lnL w="12700" cap="flat" cmpd="sng" algn="ctr">
+                      <a:solidFill>
+                        <a:schemeClr val="tx1"/>
+                      </a:solidFill>
+                      <a:prstDash val="solid"/>
+                      <a:round/>
+                      <a:headEnd type="none" w="med" len="med"/>
+                      <a:tailEnd type="none" w="med" len="med"/>
+                    </a:lnL>
+                    <a:lnR w="12700" cap="flat" cmpd="sng" algn="ctr">
+                      <a:solidFill>
+                        <a:schemeClr val="tx1"/>
+                      </a:solidFill>
+                      <a:prstDash val="solid"/>
+                      <a:round/>
+                      <a:headEnd type="none" w="med" len="med"/>
+                      <a:tailEnd type="none" w="med" len="med"/>
+                    </a:lnR>
+                    <a:lnT w="12700" cap="flat" cmpd="sng" algn="ctr">
+                      <a:solidFill>
+                        <a:schemeClr val="tx1"/>
+                      </a:solidFill>
+                      <a:prstDash val="solid"/>
+                      <a:round/>
+                      <a:headEnd type="none" w="med" len="med"/>
+                      <a:tailEnd type="none" w="med" len="med"/>
+                    </a:lnT>
+                    <a:lnB w="12700" cap="flat" cmpd="sng" algn="ctr">
+                      <a:solidFill>
+                        <a:schemeClr val="tx1"/>
+                      </a:solidFill>
+                      <a:prstDash val="solid"/>
+                      <a:round/>
+                      <a:headEnd type="none" w="med" len="med"/>
+                      <a:tailEnd type="none" w="med" len="med"/>
+                    </a:lnB>
+                    <a:lnTlToBr w="12700" cmpd="sng">
+                      <a:noFill/>
+                      <a:prstDash val="solid"/>
+                    </a:lnTlToBr>
+                    <a:lnBlToTr w="12700" cmpd="sng">
+                      <a:noFill/>
+                      <a:prstDash val="solid"/>
+                    </a:lnBlToTr>
+                    <a:solidFill>
+                      <a:schemeClr val="bg1"/>
+                    </a:solidFill>
+                  </a:tcPr>
+                </a:tc>
+                <a:tc>
+                  <a:txBody>
+                    <a:bodyPr/>
+                    <a:lstStyle/>
+                    <a:p>
+                      <a:pPr algn="ctr"/>
+                      <a:r>
+                        <a:rPr lang="en-US" sz="1400">
+                          <a:solidFill>
+                            <a:sysClr val="windowText" lastClr="000000"/>
+                          </a:solidFill>
+                        </a:rPr>
+                        <a:t>Total</a:t>
+                      </a:r>
+                    </a:p>
+                  </a:txBody>
+                  <a:tcPr>
+                    <a:lnL w="12700" cap="flat" cmpd="sng" algn="ctr">
+                      <a:solidFill>
+                        <a:schemeClr val="tx1"/>
+                      </a:solidFill>
+                      <a:prstDash val="solid"/>
+                      <a:round/>
+                      <a:headEnd type="none" w="med" len="med"/>
+                      <a:tailEnd type="none" w="med" len="med"/>
+                    </a:lnL>
+                    <a:lnR w="12700" cap="flat" cmpd="sng" algn="ctr">
+                      <a:solidFill>
+                        <a:schemeClr val="tx1"/>
+                      </a:solidFill>
+                      <a:prstDash val="solid"/>
+                      <a:round/>
+                      <a:headEnd type="none" w="med" len="med"/>
+                      <a:tailEnd type="none" w="med" len="med"/>
+                    </a:lnR>
+                    <a:lnT w="12700" cap="flat" cmpd="sng" algn="ctr">
+                      <a:solidFill>
+                        <a:schemeClr val="tx1"/>
+                      </a:solidFill>
+                      <a:prstDash val="solid"/>
+                      <a:round/>
+                      <a:headEnd type="none" w="med" len="med"/>
+                      <a:tailEnd type="none" w="med" len="med"/>
+                    </a:lnT>
+                    <a:lnB w="12700" cap="flat" cmpd="sng" algn="ctr">
+                      <a:solidFill>
+                        <a:schemeClr val="tx1"/>
+                      </a:solidFill>
+                      <a:prstDash val="solid"/>
+                      <a:round/>
+                      <a:headEnd type="none" w="med" len="med"/>
+                      <a:tailEnd type="none" w="med" len="med"/>
+                    </a:lnB>
+                    <a:lnTlToBr w="12700" cmpd="sng">
+                      <a:noFill/>
+                      <a:prstDash val="solid"/>
+                    </a:lnTlToBr>
+                    <a:lnBlToTr w="12700" cmpd="sng">
+                      <a:noFill/>
+                      <a:prstDash val="solid"/>
+                    </a:lnBlToTr>
+                    <a:solidFill>
+                      <a:schemeClr val="bg1"/>
+                    </a:solidFill>
+                  </a:tcPr>
+                </a:tc>
+                <a:extLst>
+                  <a:ext uri="{0D108BD9-81ED-4DB2-BD59-A6C34878D82A}">
+                    <a16:rowId xmlns:a16="http://schemas.microsoft.com/office/drawing/2014/main" val="872739215"/>
+                  </a:ext>
+                </a:extLst>
+              </a:tr>
+              <a:tr h="370840">
+                <a:tc>
+                  <a:txBody>
+                    <a:bodyPr/>
+                    <a:lstStyle/>
+                    <a:p>
+                      <a:pPr algn="ctr"/>
+                      <a:endParaRPr lang="en-US" sz="1400">
+                        <a:solidFill>
+                          <a:sysClr val="windowText" lastClr="000000"/>
+                        </a:solidFill>
+                      </a:endParaRPr>
+                    </a:p>
+                  </a:txBody>
+                  <a:tcPr>
+                    <a:lnL w="12700" cap="flat" cmpd="sng" algn="ctr">
+                      <a:solidFill>
+                        <a:schemeClr val="tx1"/>
+                      </a:solidFill>
+                      <a:prstDash val="solid"/>
+                      <a:round/>
+                      <a:headEnd type="none" w="med" len="med"/>
+                      <a:tailEnd type="none" w="med" len="med"/>
+                    </a:lnL>
+                    <a:lnR w="12700" cap="flat" cmpd="sng" algn="ctr">
+                      <a:solidFill>
+                        <a:schemeClr val="tx1"/>
+                      </a:solidFill>
+                      <a:prstDash val="solid"/>
+                      <a:round/>
+                      <a:headEnd type="none" w="med" len="med"/>
+                      <a:tailEnd type="none" w="med" len="med"/>
+                    </a:lnR>
+                    <a:lnT w="12700" cap="flat" cmpd="sng" algn="ctr">
+                      <a:solidFill>
+                        <a:schemeClr val="tx1"/>
+                      </a:solidFill>
+                      <a:prstDash val="solid"/>
+                      <a:round/>
+                      <a:headEnd type="none" w="med" len="med"/>
+                      <a:tailEnd type="none" w="med" len="med"/>
+                    </a:lnT>
+                    <a:lnB w="12700" cap="flat" cmpd="sng" algn="ctr">
+                      <a:solidFill>
+                        <a:schemeClr val="tx1"/>
+                      </a:solidFill>
+                      <a:prstDash val="solid"/>
+                      <a:round/>
+                      <a:headEnd type="none" w="med" len="med"/>
+                      <a:tailEnd type="none" w="med" len="med"/>
+                    </a:lnB>
+                    <a:lnTlToBr w="12700" cmpd="sng">
+                      <a:noFill/>
+                      <a:prstDash val="solid"/>
+                    </a:lnTlToBr>
+                    <a:lnBlToTr w="12700" cmpd="sng">
+                      <a:noFill/>
+                      <a:prstDash val="solid"/>
+                    </a:lnBlToTr>
+                    <a:solidFill>
+                      <a:schemeClr val="bg1"/>
+                    </a:solidFill>
+                  </a:tcPr>
+                </a:tc>
+                <a:tc>
+                  <a:txBody>
+                    <a:bodyPr/>
+                    <a:lstStyle/>
+                    <a:p>
+                      <a:pPr algn="ctr"/>
+                      <a:endParaRPr lang="en-US" sz="1400">
+                        <a:solidFill>
+                          <a:sysClr val="windowText" lastClr="000000"/>
+                        </a:solidFill>
+                      </a:endParaRPr>
+                    </a:p>
+                  </a:txBody>
+                  <a:tcPr>
+                    <a:lnL w="12700" cap="flat" cmpd="sng" algn="ctr">
+                      <a:solidFill>
+                        <a:schemeClr val="tx1"/>
+                      </a:solidFill>
+                      <a:prstDash val="solid"/>
+                      <a:round/>
+                      <a:headEnd type="none" w="med" len="med"/>
+                      <a:tailEnd type="none" w="med" len="med"/>
+                    </a:lnL>
+                    <a:lnR w="12700" cap="flat" cmpd="sng" algn="ctr">
+                      <a:solidFill>
+                        <a:schemeClr val="tx1"/>
+                      </a:solidFill>
+                      <a:prstDash val="solid"/>
+                      <a:round/>
+                      <a:headEnd type="none" w="med" len="med"/>
+                      <a:tailEnd type="none" w="med" len="med"/>
+                    </a:lnR>
+                    <a:lnT w="12700" cap="flat" cmpd="sng" algn="ctr">
+                      <a:solidFill>
+                        <a:schemeClr val="tx1"/>
+                      </a:solidFill>
+                      <a:prstDash val="solid"/>
+                      <a:round/>
+                      <a:headEnd type="none" w="med" len="med"/>
+                      <a:tailEnd type="none" w="med" len="med"/>
+                    </a:lnT>
+                    <a:lnB w="12700" cap="flat" cmpd="sng" algn="ctr">
+                      <a:solidFill>
+                        <a:schemeClr val="tx1"/>
+                      </a:solidFill>
+                      <a:prstDash val="solid"/>
+                      <a:round/>
+                      <a:headEnd type="none" w="med" len="med"/>
+                      <a:tailEnd type="none" w="med" len="med"/>
+                    </a:lnB>
+                    <a:lnTlToBr w="12700" cmpd="sng">
+                      <a:noFill/>
+                      <a:prstDash val="solid"/>
+                    </a:lnTlToBr>
+                    <a:lnBlToTr w="12700" cmpd="sng">
+                      <a:noFill/>
+                      <a:prstDash val="solid"/>
+                    </a:lnBlToTr>
+                    <a:solidFill>
+                      <a:schemeClr val="bg1"/>
+                    </a:solidFill>
+                  </a:tcPr>
+                </a:tc>
+                <a:tc>
+                  <a:txBody>
+                    <a:bodyPr/>
+                    <a:lstStyle/>
+                    <a:p>
+                      <a:pPr algn="ctr"/>
+                      <a:endParaRPr lang="en-US" sz="1400" dirty="0">
+                        <a:solidFill>
+                          <a:sysClr val="windowText" lastClr="000000"/>
+                        </a:solidFill>
+                      </a:endParaRPr>
+                    </a:p>
+                  </a:txBody>
+                  <a:tcPr>
+                    <a:lnL w="12700" cap="flat" cmpd="sng" algn="ctr">
+                      <a:solidFill>
+                        <a:schemeClr val="tx1"/>
+                      </a:solidFill>
+                      <a:prstDash val="solid"/>
+                      <a:round/>
+                      <a:headEnd type="none" w="med" len="med"/>
+                      <a:tailEnd type="none" w="med" len="med"/>
+                    </a:lnL>
+                    <a:lnR w="12700" cap="flat" cmpd="sng" algn="ctr">
+                      <a:solidFill>
+                        <a:schemeClr val="tx1"/>
+                      </a:solidFill>
+                      <a:prstDash val="solid"/>
+                      <a:round/>
+                      <a:headEnd type="none" w="med" len="med"/>
+                      <a:tailEnd type="none" w="med" len="med"/>
+                    </a:lnR>
+                    <a:lnT w="12700" cap="flat" cmpd="sng" algn="ctr">
+                      <a:solidFill>
+                        <a:schemeClr val="tx1"/>
+                      </a:solidFill>
+                      <a:prstDash val="solid"/>
+                      <a:round/>
+                      <a:headEnd type="none" w="med" len="med"/>
+                      <a:tailEnd type="none" w="med" len="med"/>
+                    </a:lnT>
+                    <a:lnB w="12700" cap="flat" cmpd="sng" algn="ctr">
+                      <a:solidFill>
+                        <a:schemeClr val="tx1"/>
+                      </a:solidFill>
+                      <a:prstDash val="solid"/>
+                      <a:round/>
+                      <a:headEnd type="none" w="med" len="med"/>
+                      <a:tailEnd type="none" w="med" len="med"/>
+                    </a:lnB>
+                    <a:lnTlToBr w="12700" cmpd="sng">
+                      <a:noFill/>
+                      <a:prstDash val="solid"/>
+                    </a:lnTlToBr>
+                    <a:lnBlToTr w="12700" cmpd="sng">
+                      <a:noFill/>
+                      <a:prstDash val="solid"/>
+                    </a:lnBlToTr>
+                    <a:solidFill>
+                      <a:schemeClr val="bg1"/>
+                    </a:solidFill>
+                  </a:tcPr>
+                </a:tc>
+                <a:tc>
+                  <a:txBody>
+                    <a:bodyPr/>
+                    <a:lstStyle/>
+                    <a:p>
+                      <a:pPr algn="ctr"/>
+                      <a:endParaRPr lang="en-US" sz="1400" dirty="0">
+                        <a:solidFill>
+                          <a:sysClr val="windowText" lastClr="000000"/>
+                        </a:solidFill>
+                      </a:endParaRPr>
+                    </a:p>
+                  </a:txBody>
+                  <a:tcPr>
+                    <a:lnL w="12700" cap="flat" cmpd="sng" algn="ctr">
+                      <a:solidFill>
+                        <a:schemeClr val="tx1"/>
+                      </a:solidFill>
+                      <a:prstDash val="solid"/>
+                      <a:round/>
+                      <a:headEnd type="none" w="med" len="med"/>
+                      <a:tailEnd type="none" w="med" len="med"/>
+                    </a:lnL>
+                    <a:lnR w="12700" cap="flat" cmpd="sng" algn="ctr">
+                      <a:solidFill>
+                        <a:schemeClr val="tx1"/>
+                      </a:solidFill>
+                      <a:prstDash val="solid"/>
+                      <a:round/>
+                      <a:headEnd type="none" w="med" len="med"/>
+                      <a:tailEnd type="none" w="med" len="med"/>
+                    </a:lnR>
+                    <a:lnT w="12700" cap="flat" cmpd="sng" algn="ctr">
+                      <a:solidFill>
+                        <a:schemeClr val="tx1"/>
+                      </a:solidFill>
+                      <a:prstDash val="solid"/>
+                      <a:round/>
+                      <a:headEnd type="none" w="med" len="med"/>
+                      <a:tailEnd type="none" w="med" len="med"/>
+                    </a:lnT>
+                    <a:lnB w="12700" cap="flat" cmpd="sng" algn="ctr">
+                      <a:solidFill>
+                        <a:schemeClr val="tx1"/>
+                      </a:solidFill>
+                      <a:prstDash val="solid"/>
+                      <a:round/>
+                      <a:headEnd type="none" w="med" len="med"/>
+                      <a:tailEnd type="none" w="med" len="med"/>
+                    </a:lnB>
+                    <a:lnTlToBr w="12700" cmpd="sng">
+                      <a:noFill/>
+                      <a:prstDash val="solid"/>
+                    </a:lnTlToBr>
+                    <a:lnBlToTr w="12700" cmpd="sng">
+                      <a:noFill/>
+                      <a:prstDash val="solid"/>
+                    </a:lnBlToTr>
+                    <a:solidFill>
+                      <a:schemeClr val="bg1"/>
+                    </a:solidFill>
+                  </a:tcPr>
+                </a:tc>
+                <a:tc>
+                  <a:txBody>
+                    <a:bodyPr/>
+                    <a:lstStyle/>
+                    <a:p>
+                      <a:pPr algn="ctr"/>
+                      <a:endParaRPr lang="en-US" sz="1400" dirty="0">
+                        <a:solidFill>
+                          <a:sysClr val="windowText" lastClr="000000"/>
+                        </a:solidFill>
+                      </a:endParaRPr>
+                    </a:p>
+                  </a:txBody>
+                  <a:tcPr>
+                    <a:lnL w="12700" cap="flat" cmpd="sng" algn="ctr">
+                      <a:solidFill>
+                        <a:schemeClr val="tx1"/>
+                      </a:solidFill>
+                      <a:prstDash val="solid"/>
+                      <a:round/>
+                      <a:headEnd type="none" w="med" len="med"/>
+                      <a:tailEnd type="none" w="med" len="med"/>
+                    </a:lnL>
+                    <a:lnR w="12700" cap="flat" cmpd="sng" algn="ctr">
+                      <a:solidFill>
+                        <a:schemeClr val="tx1"/>
+                      </a:solidFill>
+                      <a:prstDash val="solid"/>
+                      <a:round/>
+                      <a:headEnd type="none" w="med" len="med"/>
+                      <a:tailEnd type="none" w="med" len="med"/>
+                    </a:lnR>
+                    <a:lnT w="12700" cap="flat" cmpd="sng" algn="ctr">
+                      <a:solidFill>
+                        <a:schemeClr val="tx1"/>
+                      </a:solidFill>
+                      <a:prstDash val="solid"/>
+                      <a:round/>
+                      <a:headEnd type="none" w="med" len="med"/>
+                      <a:tailEnd type="none" w="med" len="med"/>
+                    </a:lnT>
+                    <a:lnB w="12700" cap="flat" cmpd="sng" algn="ctr">
+                      <a:solidFill>
+                        <a:schemeClr val="tx1"/>
+                      </a:solidFill>
+                      <a:prstDash val="solid"/>
+                      <a:round/>
+                      <a:headEnd type="none" w="med" len="med"/>
+                      <a:tailEnd type="none" w="med" len="med"/>
+                    </a:lnB>
+                    <a:lnTlToBr w="12700" cmpd="sng">
+                      <a:noFill/>
+                      <a:prstDash val="solid"/>
+                    </a:lnTlToBr>
+                    <a:lnBlToTr w="12700" cmpd="sng">
+                      <a:noFill/>
+                      <a:prstDash val="solid"/>
+                    </a:lnBlToTr>
+                    <a:solidFill>
+                      <a:schemeClr val="bg1"/>
+                    </a:solidFill>
+                  </a:tcPr>
+                </a:tc>
+                <a:extLst>
+                  <a:ext uri="{0D108BD9-81ED-4DB2-BD59-A6C34878D82A}">
+                    <a16:rowId xmlns:a16="http://schemas.microsoft.com/office/drawing/2014/main" val="3017026510"/>
+                  </a:ext>
+                </a:extLst>
+              </a:tr>
+            </a:tbl>
+          </a:graphicData>
+        </a:graphic>
+      </p:graphicFrame>
     </p:spTree>
   </p:cSld>
   <p:clrMapOvr>
@@ -10265,6 +10932,12 @@
 </file>
 
 <file path=customXml/item1.xml><?xml version="1.0" encoding="utf-8"?>
+<p:properties xmlns:p="http://schemas.microsoft.com/office/2006/metadata/properties" xmlns:xsi="http://www.w3.org/2001/XMLSchema-instance" xmlns:pc="http://schemas.microsoft.com/office/infopath/2007/PartnerControls">
+  <documentManagement/>
+</p:properties>
+</file>
+
+<file path=customXml/item2.xml><?xml version="1.0" encoding="utf-8"?>
 <?mso-contentType ?>
 <FormTemplates xmlns="http://schemas.microsoft.com/sharepoint/v3/contenttype/forms">
   <Display>DocumentLibraryForm</Display>
@@ -10273,7 +10946,7 @@
 </FormTemplates>
 </file>
 
-<file path=customXml/item2.xml><?xml version="1.0" encoding="utf-8"?>
+<file path=customXml/item3.xml><?xml version="1.0" encoding="utf-8"?>
 <ct:contentTypeSchema xmlns:ct="http://schemas.microsoft.com/office/2006/metadata/contentType" xmlns:ma="http://schemas.microsoft.com/office/2006/metadata/properties/metaAttributes" ct:_="" ma:_="" ma:contentTypeName="Document" ma:contentTypeID="0x010100481C02A60B6AFD468C514212FB974C5E" ma:contentTypeVersion="6" ma:contentTypeDescription="Create a new document." ma:contentTypeScope="" ma:versionID="722031db96f1f00426739585393a00e8">
   <xsd:schema xmlns:xsd="http://www.w3.org/2001/XMLSchema" xmlns:xs="http://www.w3.org/2001/XMLSchema" xmlns:p="http://schemas.microsoft.com/office/2006/metadata/properties" xmlns:ns2="7d301048-5679-4ae9-ad0e-8b4168c28962" xmlns:ns3="954a9c53-236d-42a7-8e3a-dd1ab9680210" targetNamespace="http://schemas.microsoft.com/office/2006/metadata/properties" ma:root="true" ma:fieldsID="860561183a8e78b3d04c014c58fdb39e" ns2:_="" ns3:_="">
     <xsd:import namespace="7d301048-5679-4ae9-ad0e-8b4168c28962"/>
@@ -10450,13 +11123,24 @@
 </ct:contentTypeSchema>
 </file>
 
-<file path=customXml/item3.xml><?xml version="1.0" encoding="utf-8"?>
-<p:properties xmlns:p="http://schemas.microsoft.com/office/2006/metadata/properties" xmlns:xsi="http://www.w3.org/2001/XMLSchema-instance" xmlns:pc="http://schemas.microsoft.com/office/infopath/2007/PartnerControls">
-  <documentManagement/>
-</p:properties>
+<file path=customXml/itemProps1.xml><?xml version="1.0" encoding="utf-8"?>
+<ds:datastoreItem xmlns:ds="http://schemas.openxmlformats.org/officeDocument/2006/customXml" ds:itemID="{9158564D-8409-4B92-8A0C-C9304D4A6BC5}">
+  <ds:schemaRefs>
+    <ds:schemaRef ds:uri="http://purl.org/dc/terms/"/>
+    <ds:schemaRef ds:uri="http://schemas.openxmlformats.org/package/2006/metadata/core-properties"/>
+    <ds:schemaRef ds:uri="http://purl.org/dc/dcmitype/"/>
+    <ds:schemaRef ds:uri="http://schemas.microsoft.com/office/infopath/2007/PartnerControls"/>
+    <ds:schemaRef ds:uri="954a9c53-236d-42a7-8e3a-dd1ab9680210"/>
+    <ds:schemaRef ds:uri="http://purl.org/dc/elements/1.1/"/>
+    <ds:schemaRef ds:uri="http://schemas.microsoft.com/office/2006/documentManagement/types"/>
+    <ds:schemaRef ds:uri="7d301048-5679-4ae9-ad0e-8b4168c28962"/>
+    <ds:schemaRef ds:uri="http://schemas.microsoft.com/office/2006/metadata/properties"/>
+    <ds:schemaRef ds:uri="http://www.w3.org/XML/1998/namespace"/>
+  </ds:schemaRefs>
+</ds:datastoreItem>
 </file>
 
-<file path=customXml/itemProps1.xml><?xml version="1.0" encoding="utf-8"?>
+<file path=customXml/itemProps2.xml><?xml version="1.0" encoding="utf-8"?>
 <ds:datastoreItem xmlns:ds="http://schemas.openxmlformats.org/officeDocument/2006/customXml" ds:itemID="{21983B0A-B8DF-4030-BB5C-B5C0B93B4BAF}">
   <ds:schemaRefs>
     <ds:schemaRef ds:uri="http://schemas.microsoft.com/sharepoint/v3/contenttype/forms"/>
@@ -10464,7 +11148,7 @@
 </ds:datastoreItem>
 </file>
 
-<file path=customXml/itemProps2.xml><?xml version="1.0" encoding="utf-8"?>
+<file path=customXml/itemProps3.xml><?xml version="1.0" encoding="utf-8"?>
 <ds:datastoreItem xmlns:ds="http://schemas.openxmlformats.org/officeDocument/2006/customXml" ds:itemID="{617734B2-8BB6-4AE2-B2DF-A60C8904C747}">
   <ds:schemaRefs>
     <ds:schemaRef ds:uri="http://schemas.microsoft.com/office/2006/metadata/contentType"/>
@@ -10481,21 +11165,4 @@
     <ds:schemaRef ds:uri="http://schemas.microsoft.com/internal/obd"/>
   </ds:schemaRefs>
 </ds:datastoreItem>
-</file>
-
-<file path=customXml/itemProps3.xml><?xml version="1.0" encoding="utf-8"?>
-<ds:datastoreItem xmlns:ds="http://schemas.openxmlformats.org/officeDocument/2006/customXml" ds:itemID="{9158564D-8409-4B92-8A0C-C9304D4A6BC5}">
-  <ds:schemaRefs>
-    <ds:schemaRef ds:uri="http://purl.org/dc/terms/"/>
-    <ds:schemaRef ds:uri="http://schemas.openxmlformats.org/package/2006/metadata/core-properties"/>
-    <ds:schemaRef ds:uri="http://purl.org/dc/dcmitype/"/>
-    <ds:schemaRef ds:uri="http://schemas.microsoft.com/office/infopath/2007/PartnerControls"/>
-    <ds:schemaRef ds:uri="954a9c53-236d-42a7-8e3a-dd1ab9680210"/>
-    <ds:schemaRef ds:uri="http://purl.org/dc/elements/1.1/"/>
-    <ds:schemaRef ds:uri="http://schemas.microsoft.com/office/2006/documentManagement/types"/>
-    <ds:schemaRef ds:uri="7d301048-5679-4ae9-ad0e-8b4168c28962"/>
-    <ds:schemaRef ds:uri="http://schemas.microsoft.com/office/2006/metadata/properties"/>
-    <ds:schemaRef ds:uri="http://www.w3.org/XML/1998/namespace"/>
-  </ds:schemaRefs>
-</ds:datastoreItem>
 </file>
</xml_diff>